<commit_message>
adding DTE interim powerpoint
</commit_message>
<xml_diff>
--- a/AdaptiveDTE/DTEInterim.pptx
+++ b/AdaptiveDTE/DTEInterim.pptx
@@ -11,6 +11,10 @@
     <p:sldId id="259" r:id="rId5"/>
     <p:sldId id="260" r:id="rId6"/>
     <p:sldId id="261" r:id="rId7"/>
+    <p:sldId id="262" r:id="rId8"/>
+    <p:sldId id="263" r:id="rId9"/>
+    <p:sldId id="264" r:id="rId10"/>
+    <p:sldId id="265" r:id="rId11"/>
   </p:sldIdLst>
   <p:sldSz cx="9144000" cy="5143500" type="screen16x9"/>
   <p:notesSz cx="6858000" cy="9144000"/>
@@ -3183,6 +3187,246 @@
 </p:sld>
 </file>
 
+<file path=ppt/slides/slide10.xml><?xml version="1.0" encoding="utf-8"?>
+<p:sld xmlns:a="http://schemas.openxmlformats.org/drawingml/2006/main" xmlns:r="http://schemas.openxmlformats.org/officeDocument/2006/relationships" xmlns:p="http://schemas.openxmlformats.org/presentationml/2006/main">
+  <p:cSld>
+    <p:spTree>
+      <p:nvGrpSpPr>
+        <p:cNvPr id="1" name=""/>
+        <p:cNvGrpSpPr/>
+        <p:nvPr/>
+      </p:nvGrpSpPr>
+      <p:grpSpPr>
+        <a:xfrm>
+          <a:off x="0" y="0"/>
+          <a:ext cx="0" cy="0"/>
+          <a:chOff x="0" y="0"/>
+          <a:chExt cx="0" cy="0"/>
+        </a:xfrm>
+      </p:grpSpPr>
+      <p:sp>
+        <p:nvSpPr>
+          <p:cNvPr id="2" name="Title 1"/>
+          <p:cNvSpPr>
+            <a:spLocks noGrp="1"/>
+          </p:cNvSpPr>
+          <p:nvPr>
+            <p:ph type="title"/>
+          </p:nvPr>
+        </p:nvSpPr>
+        <p:spPr>
+          <a:xfrm>
+            <a:off x="457201" y="204787"/>
+            <a:ext cx="3008313" cy="871538"/>
+          </a:xfrm>
+        </p:spPr>
+        <p:txBody>
+          <a:bodyPr/>
+          <a:lstStyle/>
+          <a:p>
+            <a:pPr lvl="0" indent="0" marL="0">
+              <a:buNone/>
+            </a:pPr>
+            <a:r>
+              <a:rPr/>
+              <a:t>Approximation</a:t>
+            </a:r>
+          </a:p>
+        </p:txBody>
+      </p:sp>
+      <mc:AlternateContent xmlns:mc="http://schemas.openxmlformats.org/markup-compatibility/2006">
+        <mc:Choice xmlns:a14="http://schemas.microsoft.com/office/drawing/2010/main" Requires="a14">
+          <p:sp>
+            <p:nvSpPr>
+              <p:cNvPr id="4" name="Text Placeholder 3"/>
+              <p:cNvSpPr>
+                <a:spLocks noGrp="1"/>
+              </p:cNvSpPr>
+              <p:nvPr>
+                <p:ph idx="2" sz="half" type="body"/>
+              </p:nvPr>
+            </p:nvSpPr>
+            <p:spPr/>
+            <p:txBody>
+              <a:bodyPr/>
+              <a:lstStyle/>
+              <a:p>
+                <a:pPr lvl="0" indent="0" marL="0">
+                  <a:buNone/>
+                </a:pPr>
+                <a:r>
+                  <a:rPr/>
+                  <a:t>We can approximate this by using the formula:</a:t>
+                </a:r>
+              </a:p>
+              <a:p>
+                <a:pPr lvl="0" indent="0" marL="0">
+                  <a:buNone/>
+                </a:pPr>
+                <a14:m>
+                  <m:oMathPara xmlns:m="http://schemas.openxmlformats.org/officeDocument/2006/math">
+                    <m:oMathParaPr>
+                      <m:jc m:val="center"/>
+                    </m:oMathParaPr>
+                    <m:oMath>
+                      <m:r>
+                        <m:t>1.96</m:t>
+                      </m:r>
+                      <m:r>
+                        <m:rPr>
+                          <m:sty m:val="p"/>
+                        </m:rPr>
+                        <m:t>±</m:t>
+                      </m:r>
+                      <m:rad>
+                        <m:radPr>
+                          <m:degHide m:val="1"/>
+                        </m:radPr>
+                        <m:deg/>
+                        <m:e>
+                          <m:f>
+                            <m:fPr>
+                              <m:type m:val="bar"/>
+                            </m:fPr>
+                            <m:num>
+                              <m:r>
+                                <m:t>1</m:t>
+                              </m:r>
+                            </m:num>
+                            <m:den>
+                              <m:sSub>
+                                <m:e>
+                                  <m:r>
+                                    <m:t>E</m:t>
+                                  </m:r>
+                                </m:e>
+                                <m:sub>
+                                  <m:r>
+                                    <m:t>1</m:t>
+                                  </m:r>
+                                </m:sub>
+                              </m:sSub>
+                            </m:den>
+                          </m:f>
+                          <m:r>
+                            <m:rPr>
+                              <m:sty m:val="p"/>
+                            </m:rPr>
+                            <m:t>+</m:t>
+                          </m:r>
+                          <m:f>
+                            <m:fPr>
+                              <m:type m:val="bar"/>
+                            </m:fPr>
+                            <m:num>
+                              <m:r>
+                                <m:t>1</m:t>
+                              </m:r>
+                            </m:num>
+                            <m:den>
+                              <m:sSub>
+                                <m:e>
+                                  <m:r>
+                                    <m:t>E</m:t>
+                                  </m:r>
+                                </m:e>
+                                <m:sub>
+                                  <m:r>
+                                    <m:t>2</m:t>
+                                  </m:r>
+                                </m:sub>
+                              </m:sSub>
+                            </m:den>
+                          </m:f>
+                        </m:e>
+                      </m:rad>
+                      <m:r>
+                        <m:rPr>
+                          <m:sty m:val="p"/>
+                        </m:rPr>
+                        <m:t>,</m:t>
+                      </m:r>
+                    </m:oMath>
+                  </m:oMathPara>
+                </a14:m>
+              </a:p>
+              <a:p>
+                <a:pPr lvl="0" indent="0" marL="0">
+                  <a:buNone/>
+                </a:pPr>
+                <a:r>
+                  <a:rPr/>
+                  <a:t>where </a:t>
+                </a:r>
+                <a14:m>
+                  <m:oMath xmlns:m="http://schemas.openxmlformats.org/officeDocument/2006/math">
+                    <m:sSub>
+                      <m:e>
+                        <m:r>
+                          <m:t>E</m:t>
+                        </m:r>
+                      </m:e>
+                      <m:sub>
+                        <m:r>
+                          <m:t>i</m:t>
+                        </m:r>
+                      </m:sub>
+                    </m:sSub>
+                  </m:oMath>
+                </a14:m>
+                <a:r>
+                  <a:rPr/>
+                  <a:t> is the expected number of events in group i.</a:t>
+                </a:r>
+              </a:p>
+              <a:p>
+                <a:pPr lvl="0" indent="0" marL="0">
+                  <a:buNone/>
+                </a:pPr>
+                <a:r>
+                  <a:rPr/>
+                  <a:t>This approximation produces the following histograms:</a:t>
+                </a:r>
+              </a:p>
+            </p:txBody>
+          </p:sp>
+        </mc:Choice>
+      </mc:AlternateContent>
+      <p:pic>
+        <p:nvPicPr>
+          <p:cNvPr descr="DTEInterim_files/figure-pptx/unnamed-chunk-3-1.png" id="0" name="Picture 1"/>
+          <p:cNvPicPr>
+            <a:picLocks noGrp="1" noChangeAspect="1"/>
+          </p:cNvPicPr>
+          <p:nvPr/>
+        </p:nvPicPr>
+        <p:blipFill>
+          <a:blip r:embed="rId2"/>
+          <a:stretch>
+            <a:fillRect/>
+          </a:stretch>
+        </p:blipFill>
+        <p:spPr bwMode="auto">
+          <a:xfrm>
+            <a:off x="3568700" y="355600"/>
+            <a:ext cx="5105400" cy="4089400"/>
+          </a:xfrm>
+          <a:prstGeom prst="rect">
+            <a:avLst/>
+          </a:prstGeom>
+          <a:noFill/>
+          <a:ln w="9525">
+            <a:noFill/>
+            <a:headEnd/>
+            <a:tailEnd/>
+          </a:ln>
+        </p:spPr>
+      </p:pic>
+    </p:spTree>
+  </p:cSld>
+</p:sld>
+</file>
+
 <file path=ppt/slides/slide2.xml><?xml version="1.0" encoding="utf-8"?>
 <p:sld xmlns:a="http://schemas.openxmlformats.org/drawingml/2006/main" xmlns:r="http://schemas.openxmlformats.org/officeDocument/2006/relationships" xmlns:p="http://schemas.openxmlformats.org/presentationml/2006/main">
   <p:cSld>
@@ -3439,36 +3683,12 @@
                       </m:rPr>
                       <m:t>∼</m:t>
                     </m:r>
-                    <m:r>
-                      <m:t>B</m:t>
-                    </m:r>
-                    <m:r>
-                      <m:t>e</m:t>
-                    </m:r>
-                    <m:d>
-                      <m:dPr>
-                        <m:begChr m:val="("/>
-                        <m:endChr m:val=")"/>
-                        <m:sepChr m:val=""/>
-                        <m:grow/>
-                      </m:dPr>
-                      <m:e>
-                        <m:r>
-                          <m:t>10.8</m:t>
-                        </m:r>
-                        <m:r>
-                          <m:rPr>
-                            <m:sty m:val="p"/>
-                          </m:rPr>
-                          <m:t>,</m:t>
-                        </m:r>
-                        <m:r>
-                          <m:t>6.87</m:t>
-                        </m:r>
-                      </m:e>
-                    </m:d>
                   </m:oMath>
                 </a14:m>
+                <a:r>
+                  <a:rPr/>
+                  <a:t> Be(10.8, 6.87)</a:t>
+                </a:r>
               </a:p>
             </p:txBody>
           </p:sp>
@@ -3674,6 +3894,79 @@
       </p:grpSpPr>
       <p:sp>
         <p:nvSpPr>
+          <p:cNvPr id="4" name="Text Placeholder 3"/>
+          <p:cNvSpPr>
+            <a:spLocks noGrp="1"/>
+          </p:cNvSpPr>
+          <p:nvPr>
+            <p:ph idx="2" sz="half" type="body"/>
+          </p:nvPr>
+        </p:nvSpPr>
+        <p:spPr/>
+        <p:txBody>
+          <a:bodyPr/>
+          <a:lstStyle/>
+          <a:p>
+            <a:pPr lvl="0" indent="0" marL="0">
+              <a:buNone/>
+            </a:pPr>
+          </a:p>
+        </p:txBody>
+      </p:sp>
+      <p:pic>
+        <p:nvPicPr>
+          <p:cNvPr descr="DTEInterim_files/figure-pptx/posteriors-1.png" id="0" name="Picture 1"/>
+          <p:cNvPicPr>
+            <a:picLocks noGrp="1" noChangeAspect="1"/>
+          </p:cNvPicPr>
+          <p:nvPr/>
+        </p:nvPicPr>
+        <p:blipFill>
+          <a:blip r:embed="rId2"/>
+          <a:stretch>
+            <a:fillRect/>
+          </a:stretch>
+        </p:blipFill>
+        <p:spPr bwMode="auto">
+          <a:xfrm>
+            <a:off x="3568700" y="355600"/>
+            <a:ext cx="5105400" cy="4089400"/>
+          </a:xfrm>
+          <a:prstGeom prst="rect">
+            <a:avLst/>
+          </a:prstGeom>
+          <a:noFill/>
+          <a:ln w="9525">
+            <a:noFill/>
+            <a:headEnd/>
+            <a:tailEnd/>
+          </a:ln>
+        </p:spPr>
+      </p:pic>
+    </p:spTree>
+  </p:cSld>
+</p:sld>
+</file>
+
+<file path=ppt/slides/slide7.xml><?xml version="1.0" encoding="utf-8"?>
+<p:sld xmlns:a="http://schemas.openxmlformats.org/drawingml/2006/main" xmlns:r="http://schemas.openxmlformats.org/officeDocument/2006/relationships" xmlns:p="http://schemas.openxmlformats.org/presentationml/2006/main">
+  <p:cSld>
+    <p:spTree>
+      <p:nvGrpSpPr>
+        <p:cNvPr id="1" name=""/>
+        <p:cNvGrpSpPr/>
+        <p:nvPr/>
+      </p:nvGrpSpPr>
+      <p:grpSpPr>
+        <a:xfrm>
+          <a:off x="0" y="0"/>
+          <a:ext cx="0" cy="0"/>
+          <a:chOff x="0" y="0"/>
+          <a:chExt cx="0" cy="0"/>
+        </a:xfrm>
+      </p:grpSpPr>
+      <p:sp>
+        <p:nvSpPr>
           <p:cNvPr id="2" name="Title 1"/>
           <p:cNvSpPr>
             <a:spLocks noGrp="1"/>
@@ -3692,11 +3985,208 @@
             </a:pPr>
             <a:r>
               <a:rPr/>
-              <a:t>Slide with Plot</a:t>
-            </a:r>
-          </a:p>
-        </p:txBody>
-      </p:sp>
+              <a:t>Set-up</a:t>
+            </a:r>
+          </a:p>
+        </p:txBody>
+      </p:sp>
+      <p:sp>
+        <p:nvSpPr>
+          <p:cNvPr id="3" name="Content Placeholder 2"/>
+          <p:cNvSpPr>
+            <a:spLocks noGrp="1"/>
+          </p:cNvSpPr>
+          <p:nvPr>
+            <p:ph idx="1"/>
+          </p:nvPr>
+        </p:nvSpPr>
+        <p:spPr/>
+        <p:txBody>
+          <a:bodyPr/>
+          <a:lstStyle/>
+          <a:p>
+            <a:pPr lvl="0" indent="0" marL="0">
+              <a:buNone/>
+            </a:pPr>
+            <a:r>
+              <a:rPr/>
+              <a:t>Now we have this mechanism, how can we use it to investigate the problem of choosing the ‘optimum’ time to perform an interim analysis? What do these posteriors tell us?</a:t>
+            </a:r>
+          </a:p>
+          <a:p>
+            <a:pPr lvl="0" indent="0" marL="0">
+              <a:buNone/>
+            </a:pPr>
+            <a:r>
+              <a:rPr/>
+              <a:t>We can change the interim analysis time and see what effect this has on the posteriors. We hypothesize that as we increase the IA time, the posterior for the HR will be more concentrated around the “true” value.</a:t>
+            </a:r>
+          </a:p>
+          <a:p>
+            <a:pPr lvl="0" indent="0" marL="0">
+              <a:buNone/>
+            </a:pPr>
+            <a:r>
+              <a:rPr/>
+              <a:t>To investigate this, we choose some target effect and calculate the proportion of the posterior which is less than this target value.</a:t>
+            </a:r>
+          </a:p>
+        </p:txBody>
+      </p:sp>
+    </p:spTree>
+  </p:cSld>
+</p:sld>
+</file>
+
+<file path=ppt/slides/slide8.xml><?xml version="1.0" encoding="utf-8"?>
+<p:sld xmlns:a="http://schemas.openxmlformats.org/drawingml/2006/main" xmlns:r="http://schemas.openxmlformats.org/officeDocument/2006/relationships" xmlns:p="http://schemas.openxmlformats.org/presentationml/2006/main">
+  <p:cSld>
+    <p:spTree>
+      <p:nvGrpSpPr>
+        <p:cNvPr id="1" name=""/>
+        <p:cNvGrpSpPr/>
+        <p:nvPr/>
+      </p:nvGrpSpPr>
+      <p:grpSpPr>
+        <a:xfrm>
+          <a:off x="0" y="0"/>
+          <a:ext cx="0" cy="0"/>
+          <a:chOff x="0" y="0"/>
+          <a:chExt cx="0" cy="0"/>
+        </a:xfrm>
+      </p:grpSpPr>
+      <p:sp>
+        <p:nvSpPr>
+          <p:cNvPr id="2" name="Title 1"/>
+          <p:cNvSpPr>
+            <a:spLocks noGrp="1"/>
+          </p:cNvSpPr>
+          <p:nvPr>
+            <p:ph type="title"/>
+          </p:nvPr>
+        </p:nvSpPr>
+        <p:spPr/>
+        <p:txBody>
+          <a:bodyPr/>
+          <a:lstStyle/>
+          <a:p>
+            <a:pPr lvl="0" indent="0" marL="0">
+              <a:buNone/>
+            </a:pPr>
+            <a:r>
+              <a:rPr/>
+              <a:t>Set-up</a:t>
+            </a:r>
+          </a:p>
+        </p:txBody>
+      </p:sp>
+      <p:pic>
+        <p:nvPicPr>
+          <p:cNvPr descr="DTEInterim_files/figure-pptx/unnamed-chunk-1-1.png" id="0" name="Picture 1"/>
+          <p:cNvPicPr>
+            <a:picLocks noGrp="1" noChangeAspect="1"/>
+          </p:cNvPicPr>
+          <p:nvPr/>
+        </p:nvPicPr>
+        <p:blipFill>
+          <a:blip r:embed="rId2"/>
+          <a:stretch>
+            <a:fillRect/>
+          </a:stretch>
+        </p:blipFill>
+        <p:spPr bwMode="auto">
+          <a:xfrm>
+            <a:off x="2451100" y="1193800"/>
+            <a:ext cx="4241800" cy="3390900"/>
+          </a:xfrm>
+          <a:prstGeom prst="rect">
+            <a:avLst/>
+          </a:prstGeom>
+          <a:noFill/>
+          <a:ln w="9525">
+            <a:noFill/>
+            <a:headEnd/>
+            <a:tailEnd/>
+          </a:ln>
+        </p:spPr>
+      </p:pic>
+    </p:spTree>
+  </p:cSld>
+</p:sld>
+</file>
+
+<file path=ppt/slides/slide9.xml><?xml version="1.0" encoding="utf-8"?>
+<p:sld xmlns:a="http://schemas.openxmlformats.org/drawingml/2006/main" xmlns:r="http://schemas.openxmlformats.org/officeDocument/2006/relationships" xmlns:p="http://schemas.openxmlformats.org/presentationml/2006/main">
+  <p:cSld>
+    <p:spTree>
+      <p:nvGrpSpPr>
+        <p:cNvPr id="1" name=""/>
+        <p:cNvGrpSpPr/>
+        <p:nvPr/>
+      </p:nvGrpSpPr>
+      <p:grpSpPr>
+        <a:xfrm>
+          <a:off x="0" y="0"/>
+          <a:ext cx="0" cy="0"/>
+          <a:chOff x="0" y="0"/>
+          <a:chExt cx="0" cy="0"/>
+        </a:xfrm>
+      </p:grpSpPr>
+      <p:sp>
+        <p:nvSpPr>
+          <p:cNvPr id="2" name="Title 1"/>
+          <p:cNvSpPr>
+            <a:spLocks noGrp="1"/>
+          </p:cNvSpPr>
+          <p:nvPr>
+            <p:ph type="title"/>
+          </p:nvPr>
+        </p:nvSpPr>
+        <p:spPr/>
+        <p:txBody>
+          <a:bodyPr/>
+          <a:lstStyle/>
+          <a:p>
+            <a:pPr lvl="0" indent="0" marL="0">
+              <a:buNone/>
+            </a:pPr>
+            <a:r>
+              <a:rPr/>
+              <a:t>Set-up</a:t>
+            </a:r>
+          </a:p>
+        </p:txBody>
+      </p:sp>
+      <p:pic>
+        <p:nvPicPr>
+          <p:cNvPr descr="DTEInterim_files/figure-pptx/unnamed-chunk-2-1.png" id="0" name="Picture 1"/>
+          <p:cNvPicPr>
+            <a:picLocks noGrp="1" noChangeAspect="1"/>
+          </p:cNvPicPr>
+          <p:nvPr/>
+        </p:nvPicPr>
+        <p:blipFill>
+          <a:blip r:embed="rId2"/>
+          <a:stretch>
+            <a:fillRect/>
+          </a:stretch>
+        </p:blipFill>
+        <p:spPr bwMode="auto">
+          <a:xfrm>
+            <a:off x="2451100" y="1193800"/>
+            <a:ext cx="4241800" cy="3390900"/>
+          </a:xfrm>
+          <a:prstGeom prst="rect">
+            <a:avLst/>
+          </a:prstGeom>
+          <a:noFill/>
+          <a:ln w="9525">
+            <a:noFill/>
+            <a:headEnd/>
+            <a:tailEnd/>
+          </a:ln>
+        </p:spPr>
+      </p:pic>
     </p:spTree>
   </p:cSld>
 </p:sld>

</xml_diff>